<commit_message>
Updated Lesson05 - removed txt and fixed text in presentation.
</commit_message>
<xml_diff>
--- a/Урок 05. Алгоритмы/Урок 5. Алгоритмы.pptx
+++ b/Урок 05. Алгоритмы/Урок 5. Алгоритмы.pptx
@@ -226,7 +226,7 @@
           <a:p>
             <a:fld id="{604F1A3C-7094-4025-80B2-EF9BF9D263AD}" type="datetimeFigureOut">
               <a:rPr lang="en-US" smtClean="0"/>
-              <a:t>6/11/2023</a:t>
+              <a:t>10/10/2024</a:t>
             </a:fld>
             <a:endParaRPr lang="en-US"/>
           </a:p>
@@ -640,7 +640,7 @@
           <a:p>
             <a:fld id="{A765B8F1-23B3-4187-818C-C69CAAB85054}" type="datetimeFigureOut">
               <a:rPr lang="en-US" smtClean="0"/>
-              <a:t>6/11/2023</a:t>
+              <a:t>10/10/2024</a:t>
             </a:fld>
             <a:endParaRPr lang="en-US"/>
           </a:p>
@@ -838,7 +838,7 @@
           <a:p>
             <a:fld id="{A765B8F1-23B3-4187-818C-C69CAAB85054}" type="datetimeFigureOut">
               <a:rPr lang="en-US" smtClean="0"/>
-              <a:t>6/11/2023</a:t>
+              <a:t>10/10/2024</a:t>
             </a:fld>
             <a:endParaRPr lang="en-US"/>
           </a:p>
@@ -1046,7 +1046,7 @@
           <a:p>
             <a:fld id="{A765B8F1-23B3-4187-818C-C69CAAB85054}" type="datetimeFigureOut">
               <a:rPr lang="en-US" smtClean="0"/>
-              <a:t>6/11/2023</a:t>
+              <a:t>10/10/2024</a:t>
             </a:fld>
             <a:endParaRPr lang="en-US"/>
           </a:p>
@@ -1244,7 +1244,7 @@
           <a:p>
             <a:fld id="{A765B8F1-23B3-4187-818C-C69CAAB85054}" type="datetimeFigureOut">
               <a:rPr lang="en-US" smtClean="0"/>
-              <a:t>6/11/2023</a:t>
+              <a:t>10/10/2024</a:t>
             </a:fld>
             <a:endParaRPr lang="en-US"/>
           </a:p>
@@ -1519,7 +1519,7 @@
           <a:p>
             <a:fld id="{A765B8F1-23B3-4187-818C-C69CAAB85054}" type="datetimeFigureOut">
               <a:rPr lang="en-US" smtClean="0"/>
-              <a:t>6/11/2023</a:t>
+              <a:t>10/10/2024</a:t>
             </a:fld>
             <a:endParaRPr lang="en-US"/>
           </a:p>
@@ -1784,7 +1784,7 @@
           <a:p>
             <a:fld id="{A765B8F1-23B3-4187-818C-C69CAAB85054}" type="datetimeFigureOut">
               <a:rPr lang="en-US" smtClean="0"/>
-              <a:t>6/11/2023</a:t>
+              <a:t>10/10/2024</a:t>
             </a:fld>
             <a:endParaRPr lang="en-US"/>
           </a:p>
@@ -2196,7 +2196,7 @@
           <a:p>
             <a:fld id="{A765B8F1-23B3-4187-818C-C69CAAB85054}" type="datetimeFigureOut">
               <a:rPr lang="en-US" smtClean="0"/>
-              <a:t>6/11/2023</a:t>
+              <a:t>10/10/2024</a:t>
             </a:fld>
             <a:endParaRPr lang="en-US"/>
           </a:p>
@@ -2337,7 +2337,7 @@
           <a:p>
             <a:fld id="{A765B8F1-23B3-4187-818C-C69CAAB85054}" type="datetimeFigureOut">
               <a:rPr lang="en-US" smtClean="0"/>
-              <a:t>6/11/2023</a:t>
+              <a:t>10/10/2024</a:t>
             </a:fld>
             <a:endParaRPr lang="en-US"/>
           </a:p>
@@ -2450,7 +2450,7 @@
           <a:p>
             <a:fld id="{A765B8F1-23B3-4187-818C-C69CAAB85054}" type="datetimeFigureOut">
               <a:rPr lang="en-US" smtClean="0"/>
-              <a:t>6/11/2023</a:t>
+              <a:t>10/10/2024</a:t>
             </a:fld>
             <a:endParaRPr lang="en-US"/>
           </a:p>
@@ -2761,7 +2761,7 @@
           <a:p>
             <a:fld id="{A765B8F1-23B3-4187-818C-C69CAAB85054}" type="datetimeFigureOut">
               <a:rPr lang="en-US" smtClean="0"/>
-              <a:t>6/11/2023</a:t>
+              <a:t>10/10/2024</a:t>
             </a:fld>
             <a:endParaRPr lang="en-US"/>
           </a:p>
@@ -3049,7 +3049,7 @@
           <a:p>
             <a:fld id="{A765B8F1-23B3-4187-818C-C69CAAB85054}" type="datetimeFigureOut">
               <a:rPr lang="en-US" smtClean="0"/>
-              <a:t>6/11/2023</a:t>
+              <a:t>10/10/2024</a:t>
             </a:fld>
             <a:endParaRPr lang="en-US"/>
           </a:p>
@@ -3290,7 +3290,7 @@
           <a:p>
             <a:fld id="{A765B8F1-23B3-4187-818C-C69CAAB85054}" type="datetimeFigureOut">
               <a:rPr lang="en-US" smtClean="0"/>
-              <a:t>6/11/2023</a:t>
+              <a:t>10/10/2024</a:t>
             </a:fld>
             <a:endParaRPr lang="en-US"/>
           </a:p>
@@ -5091,7 +5091,29 @@
                   <a:ea typeface="Meiryo" panose="020B0604030504040204" pitchFamily="34" charset="-128"/>
                   <a:cs typeface="Arial" panose="020B0604020202020204" pitchFamily="34" charset="0"/>
                 </a:rPr>
-                <a:t> – алгоритм  приводит к определённому результату.</a:t>
+                <a:t> – </a:t>
+              </a:r>
+              <a:r>
+                <a:rPr lang="ru-RU" sz="2800">
+                  <a:solidFill>
+                    <a:srgbClr val="FFFFFF"/>
+                  </a:solidFill>
+                  <a:latin typeface="Arial" panose="020B0604020202020204" pitchFamily="34" charset="0"/>
+                  <a:ea typeface="Meiryo" panose="020B0604030504040204" pitchFamily="34" charset="-128"/>
+                  <a:cs typeface="Arial" panose="020B0604020202020204" pitchFamily="34" charset="0"/>
+                </a:rPr>
+                <a:t>алгоритм приводит </a:t>
+              </a:r>
+              <a:r>
+                <a:rPr lang="ru-RU" sz="2800" dirty="0">
+                  <a:solidFill>
+                    <a:srgbClr val="FFFFFF"/>
+                  </a:solidFill>
+                  <a:latin typeface="Arial" panose="020B0604020202020204" pitchFamily="34" charset="0"/>
+                  <a:ea typeface="Meiryo" panose="020B0604030504040204" pitchFamily="34" charset="-128"/>
+                  <a:cs typeface="Arial" panose="020B0604020202020204" pitchFamily="34" charset="0"/>
+                </a:rPr>
+                <a:t>к определённому результату.</a:t>
               </a:r>
             </a:p>
             <a:p>

</xml_diff>